<commit_message>
Update Week 12 Software Quality Management.pptx
</commit_message>
<xml_diff>
--- a/Slides/Week 12 Software Quality Management.pptx
+++ b/Slides/Week 12 Software Quality Management.pptx
@@ -232,7 +232,7 @@
           <a:p>
             <a:fld id="{0FEC1AAB-5E7C-43B3-93F1-3B00C2708E32}" type="datetimeFigureOut">
               <a:rPr lang="th-TH" smtClean="0"/>
-              <a:t>12/11/61</a:t>
+              <a:t>31/10/62</a:t>
             </a:fld>
             <a:endParaRPr lang="th-TH"/>
           </a:p>
@@ -410,7 +410,7 @@
           <a:p>
             <a:fld id="{5B1B5456-0566-42F4-BCC8-DF5300E15663}" type="datetimeFigureOut">
               <a:rPr lang="th-TH" smtClean="0"/>
-              <a:t>12/11/61</a:t>
+              <a:t>31/10/62</a:t>
             </a:fld>
             <a:endParaRPr lang="th-TH"/>
           </a:p>
@@ -6528,7 +6528,7 @@
           <a:p>
             <a:r>
               <a:rPr lang="th-TH"/>
-              <a:t>2561.11.13</a:t>
+              <a:t>2562.11.01</a:t>
             </a:r>
           </a:p>
         </p:txBody>
@@ -6701,7 +6701,7 @@
           <a:p>
             <a:r>
               <a:rPr lang="th-TH"/>
-              <a:t>2561.11.13</a:t>
+              <a:t>2562.11.01</a:t>
             </a:r>
           </a:p>
         </p:txBody>
@@ -6884,7 +6884,7 @@
           <a:p>
             <a:r>
               <a:rPr lang="th-TH"/>
-              <a:t>2561.11.13</a:t>
+              <a:t>2562.11.01</a:t>
             </a:r>
           </a:p>
         </p:txBody>
@@ -7122,7 +7122,7 @@
           <a:p>
             <a:r>
               <a:rPr lang="th-TH"/>
-              <a:t>2561.11.13</a:t>
+              <a:t>2562.11.01</a:t>
             </a:r>
             <a:endParaRPr lang="th-TH" dirty="0"/>
           </a:p>
@@ -7393,7 +7393,7 @@
           <a:p>
             <a:r>
               <a:rPr lang="th-TH"/>
-              <a:t>2561.11.13</a:t>
+              <a:t>2562.11.01</a:t>
             </a:r>
           </a:p>
         </p:txBody>
@@ -7634,7 +7634,7 @@
           <a:p>
             <a:r>
               <a:rPr lang="th-TH"/>
-              <a:t>2561.11.13</a:t>
+              <a:t>2562.11.01</a:t>
             </a:r>
           </a:p>
         </p:txBody>
@@ -8004,7 +8004,7 @@
           <a:p>
             <a:r>
               <a:rPr lang="th-TH"/>
-              <a:t>2561.11.13</a:t>
+              <a:t>2562.11.01</a:t>
             </a:r>
           </a:p>
         </p:txBody>
@@ -8130,7 +8130,7 @@
           <a:p>
             <a:r>
               <a:rPr lang="th-TH"/>
-              <a:t>2561.11.13</a:t>
+              <a:t>2562.11.01</a:t>
             </a:r>
           </a:p>
         </p:txBody>
@@ -8228,7 +8228,7 @@
           <a:p>
             <a:r>
               <a:rPr lang="th-TH"/>
-              <a:t>2561.11.13</a:t>
+              <a:t>2562.11.01</a:t>
             </a:r>
           </a:p>
         </p:txBody>
@@ -8508,7 +8508,7 @@
           <a:p>
             <a:r>
               <a:rPr lang="th-TH"/>
-              <a:t>2561.11.13</a:t>
+              <a:t>2562.11.01</a:t>
             </a:r>
           </a:p>
         </p:txBody>
@@ -8768,7 +8768,7 @@
           <a:p>
             <a:r>
               <a:rPr lang="th-TH"/>
-              <a:t>2561.11.13</a:t>
+              <a:t>2562.11.01</a:t>
             </a:r>
           </a:p>
         </p:txBody>
@@ -8984,7 +8984,7 @@
           <a:p>
             <a:r>
               <a:rPr lang="th-TH"/>
-              <a:t>2561.11.13</a:t>
+              <a:t>2562.11.01</a:t>
             </a:r>
           </a:p>
         </p:txBody>
@@ -9788,7 +9788,7 @@
           <a:p>
             <a:r>
               <a:rPr lang="th-TH"/>
-              <a:t>2561.11.13</a:t>
+              <a:t>2562.11.01</a:t>
             </a:r>
             <a:endParaRPr lang="th-TH" dirty="0"/>
           </a:p>
@@ -9952,7 +9952,7 @@
           <a:p>
             <a:r>
               <a:rPr lang="th-TH"/>
-              <a:t>2561.11.13</a:t>
+              <a:t>2562.11.01</a:t>
             </a:r>
             <a:endParaRPr lang="th-TH" dirty="0"/>
           </a:p>
@@ -10747,7 +10747,18 @@
                   <a:srgbClr val="3366FF"/>
                 </a:solidFill>
               </a:rPr>
-              <a:t>ไม่สามารถปรับแต่งระบบใด ๆ ให้เหมาะกับคุณลักษณะเหล่านี้ทั้งหมดเช่นการปรับปรุงความแข็งแกร่งอาจทำให้ประสิทธิภาพการทำงานลดลง</a:t>
+              <a:t>ไม่สามารถปรับแต่งระบบใด ๆ ให้เหมาะกับคุณลักษณะเหล่านี้ทั้งหมด</a:t>
+            </a:r>
+          </a:p>
+          <a:p>
+            <a:pPr marL="969963" lvl="1" indent="-512763"/>
+            <a:r>
+              <a:rPr lang="th-TH" dirty="0">
+                <a:solidFill>
+                  <a:srgbClr val="FF00FF"/>
+                </a:solidFill>
+              </a:rPr>
+              <a:t>เช่นการปรับปรุงความแข็งแกร่งอาจทำให้ประสิทธิภาพการทำงานลดลง</a:t>
             </a:r>
           </a:p>
           <a:p>
@@ -10758,7 +10769,23 @@
                   <a:srgbClr val="3366FF"/>
                 </a:solidFill>
               </a:rPr>
-              <a:t>แผนคุณภาพจึงควรกำหนดคุณลักษณะคุณภาพที่สำคัญที่สุดสำหรับซอฟต์แวร์ที่กำลังพัฒนาขึ้น</a:t>
+              <a:t>แผนคุณภาพจึงควรกำหนด</a:t>
+            </a:r>
+            <a:r>
+              <a:rPr lang="th-TH" dirty="0">
+                <a:solidFill>
+                  <a:srgbClr val="FF00FF"/>
+                </a:solidFill>
+              </a:rPr>
+              <a:t>คุณลักษณะคุณภาพที่สำคัญที่สุด</a:t>
+            </a:r>
+            <a:r>
+              <a:rPr lang="th-TH" dirty="0">
+                <a:solidFill>
+                  <a:srgbClr val="3366FF"/>
+                </a:solidFill>
+              </a:rPr>
+              <a:t>สำหรับซอฟต์แวร์ที่กำลังพัฒนาขึ้น</a:t>
             </a:r>
           </a:p>
           <a:p>
@@ -10769,7 +10796,39 @@
                   <a:srgbClr val="3366FF"/>
                 </a:solidFill>
               </a:rPr>
-              <a:t>แผนควรรวมถึงคำนิยามของกระบวนการประเมินคุณภาพซึ่งเป็นวิธีที่ตกลงกันในการประเมินว่ามีคุณภาพบางอย่างเช่นความสามารถในการบำรุงรักษาหรือความทนทานอยู่ในผลิตภัณฑ์</a:t>
+              <a:t>แผนควรรวมถึงคำนิยามของกระบวนการประเมินคุณภาพซึ่งเป็นวิธีที่ตกลงกันในการประเมินว่ามีคุณภาพบางอย่างเช่น</a:t>
+            </a:r>
+            <a:r>
+              <a:rPr lang="th-TH" dirty="0">
+                <a:solidFill>
+                  <a:srgbClr val="FF00FF"/>
+                </a:solidFill>
+              </a:rPr>
+              <a:t>ความสามารถในการบำรุงรักษา</a:t>
+            </a:r>
+            <a:r>
+              <a:rPr lang="th-TH" dirty="0">
+                <a:solidFill>
+                  <a:srgbClr val="3366FF"/>
+                </a:solidFill>
+              </a:rPr>
+              <a:t>หรือ</a:t>
+            </a:r>
+            <a:r>
+              <a:rPr lang="th-TH" dirty="0">
+                <a:solidFill>
+                  <a:srgbClr val="FF00FF"/>
+                </a:solidFill>
+              </a:rPr>
+              <a:t>ความทนทาน</a:t>
+            </a:r>
+            <a:r>
+              <a:rPr lang="th-TH" dirty="0">
+                <a:solidFill>
+                  <a:srgbClr val="3366FF"/>
+                </a:solidFill>
+              </a:rPr>
+              <a:t>อยู่ในผลิตภัณฑ์</a:t>
             </a:r>
             <a:endParaRPr lang="th-TH" sz="3700" dirty="0">
               <a:solidFill>
@@ -10831,7 +10890,7 @@
           <a:p>
             <a:r>
               <a:rPr lang="th-TH"/>
-              <a:t>2561.11.13</a:t>
+              <a:t>2562.11.01</a:t>
             </a:r>
             <a:endParaRPr lang="th-TH" dirty="0"/>
           </a:p>
@@ -10975,21 +11034,37 @@
             <a:r>
               <a:rPr lang="th-TH" dirty="0">
                 <a:solidFill>
+                  <a:srgbClr val="C00000"/>
+                </a:solidFill>
+              </a:rPr>
+              <a:t>คุณภาพของผลิตภัณฑ์</a:t>
+            </a:r>
+            <a:r>
+              <a:rPr lang="th-TH" dirty="0">
+                <a:solidFill>
                   <a:srgbClr val="3366FF"/>
                 </a:solidFill>
               </a:rPr>
-              <a:t>คุณภาพของผลิตภัณฑ์มักจะได้รับผลกระทบจากคุณภาพของกระบวนการผลิต</a:t>
-            </a:r>
-          </a:p>
-          <a:p>
-            <a:pPr marL="512763" indent="-512763"/>
+              <a:t>มักจะได้รับผลกระทบจาก</a:t>
+            </a:r>
             <a:r>
               <a:rPr lang="th-TH" dirty="0">
                 <a:solidFill>
-                  <a:srgbClr val="3366FF"/>
-                </a:solidFill>
-              </a:rPr>
-              <a:t>นี่เป็นสิ่งสำคัญในการพัฒนาซอฟต์แวร์ เนื่องจากคุณลักษณะบางอย่างของคุณภาพของผลิตภัณฑ์นั้นยากที่จะประเมินได้</a:t>
+                  <a:srgbClr val="C00000"/>
+                </a:solidFill>
+              </a:rPr>
+              <a:t>คุณภาพของกระบวนการผลิต</a:t>
+            </a:r>
+          </a:p>
+          <a:p>
+            <a:pPr marL="969963" lvl="1" indent="-512763"/>
+            <a:r>
+              <a:rPr lang="th-TH" dirty="0">
+                <a:solidFill>
+                  <a:srgbClr val="FF00FF"/>
+                </a:solidFill>
+              </a:rPr>
+              <a:t>นับเป็นสิ่งสำคัญในการพัฒนาซอฟต์แวร์ เนื่องจากคุณลักษณะบางอย่างของคุณภาพของผลิตภัณฑ์นั้นยากที่จะประเมินได้</a:t>
             </a:r>
           </a:p>
           <a:p>
@@ -11129,7 +11204,7 @@
           <a:p>
             <a:r>
               <a:rPr lang="th-TH"/>
-              <a:t>2561.11.13</a:t>
+              <a:t>2562.11.01</a:t>
             </a:r>
             <a:endParaRPr lang="th-TH" dirty="0"/>
           </a:p>
@@ -11292,23 +11367,39 @@
                   <a:srgbClr val="3366FF"/>
                 </a:solidFill>
               </a:rPr>
-              <a:t>ควรมุ่งมั่นที่จะพัฒนา 'วัฒนธรรมคุณภาพ’ (</a:t>
+              <a:t>ควรมุ่งมั่นที่จะพัฒนา</a:t>
+            </a:r>
+            <a:r>
+              <a:rPr lang="th-TH" dirty="0">
+                <a:solidFill>
+                  <a:srgbClr val="C00000"/>
+                </a:solidFill>
+              </a:rPr>
+              <a:t> 'วัฒนธรรมคุณภาพ’ (</a:t>
             </a:r>
             <a:r>
               <a:rPr lang="en-US" dirty="0">
                 <a:solidFill>
+                  <a:srgbClr val="C00000"/>
+                </a:solidFill>
+              </a:rPr>
+              <a:t>quality culture</a:t>
+            </a:r>
+            <a:r>
+              <a:rPr lang="th-TH" dirty="0">
+                <a:solidFill>
+                  <a:srgbClr val="C00000"/>
+                </a:solidFill>
+              </a:rPr>
+              <a:t>) </a:t>
+            </a:r>
+            <a:r>
+              <a:rPr lang="th-TH" dirty="0">
+                <a:solidFill>
                   <a:srgbClr val="3366FF"/>
                 </a:solidFill>
               </a:rPr>
-              <a:t>quality culture</a:t>
-            </a:r>
-            <a:r>
-              <a:rPr lang="th-TH" dirty="0">
-                <a:solidFill>
-                  <a:srgbClr val="3366FF"/>
-                </a:solidFill>
-              </a:rPr>
-              <a:t>) ซึ่งทุกคนรับผิดชอบด้านการพัฒนาซอฟต์แวร์มุ่งมั่นที่จะบรรลุถึงคุณภาพของผลิตภัณฑ์ในระดับสูง</a:t>
+              <a:t>ซึ่งทุกคนที่รับผิดชอบด้านการพัฒนาซอฟต์แวร์ต้องมุ่งมั่นที่จะบรรลุถึงคุณภาพของผลิตภัณฑ์ในระดับสูง</a:t>
             </a:r>
           </a:p>
           <a:p>
@@ -11376,7 +11467,7 @@
           <a:p>
             <a:r>
               <a:rPr lang="th-TH"/>
-              <a:t>2561.11.13</a:t>
+              <a:t>2562.11.01</a:t>
             </a:r>
             <a:endParaRPr lang="th-TH" dirty="0"/>
           </a:p>
@@ -11543,7 +11634,7 @@
           <a:p>
             <a:r>
               <a:rPr lang="th-TH"/>
-              <a:t>2561.11.13</a:t>
+              <a:t>2562.11.01</a:t>
             </a:r>
             <a:endParaRPr lang="th-TH" dirty="0"/>
           </a:p>
@@ -11750,11 +11841,11 @@
             </a:r>
           </a:p>
           <a:p>
-            <a:pPr marL="512763" indent="-512763"/>
+            <a:pPr marL="969963" lvl="1" indent="-512763"/>
             <a:r>
               <a:rPr lang="th-TH" dirty="0">
                 <a:solidFill>
-                  <a:srgbClr val="3366FF"/>
+                  <a:srgbClr val="FF00FF"/>
                 </a:solidFill>
               </a:rPr>
               <a:t>มาตรฐานระหว่างประเทศ (</a:t>
@@ -11762,7 +11853,7 @@
             <a:r>
               <a:rPr lang="en-US" dirty="0">
                 <a:solidFill>
-                  <a:srgbClr val="3366FF"/>
+                  <a:srgbClr val="FF00FF"/>
                 </a:solidFill>
               </a:rPr>
               <a:t>international standards</a:t>
@@ -11770,26 +11861,26 @@
             <a:r>
               <a:rPr lang="th-TH" dirty="0">
                 <a:solidFill>
-                  <a:srgbClr val="3366FF"/>
+                  <a:srgbClr val="FF00FF"/>
                 </a:solidFill>
               </a:rPr>
               <a:t>) </a:t>
             </a:r>
           </a:p>
           <a:p>
-            <a:pPr marL="512763" indent="-512763"/>
+            <a:pPr marL="969963" lvl="1" indent="-512763"/>
             <a:r>
               <a:rPr lang="th-TH" dirty="0">
                 <a:solidFill>
-                  <a:srgbClr val="3366FF"/>
-                </a:solidFill>
-              </a:rPr>
-              <a:t>ระดับชาติ (</a:t>
+                  <a:srgbClr val="FF00FF"/>
+                </a:solidFill>
+              </a:rPr>
+              <a:t>มาตรฐานระดับชาติ (</a:t>
             </a:r>
             <a:r>
               <a:rPr lang="en-US" dirty="0">
                 <a:solidFill>
-                  <a:srgbClr val="3366FF"/>
+                  <a:srgbClr val="FF00FF"/>
                 </a:solidFill>
               </a:rPr>
               <a:t>national standards</a:t>
@@ -11797,26 +11888,26 @@
             <a:r>
               <a:rPr lang="th-TH" dirty="0">
                 <a:solidFill>
-                  <a:srgbClr val="3366FF"/>
+                  <a:srgbClr val="FF00FF"/>
                 </a:solidFill>
               </a:rPr>
               <a:t>) </a:t>
             </a:r>
           </a:p>
           <a:p>
-            <a:pPr marL="512763" indent="-512763"/>
+            <a:pPr marL="969963" lvl="1" indent="-512763"/>
             <a:r>
               <a:rPr lang="th-TH" dirty="0">
                 <a:solidFill>
-                  <a:srgbClr val="3366FF"/>
-                </a:solidFill>
-              </a:rPr>
-              <a:t>ระดับองค์กร (</a:t>
+                  <a:srgbClr val="FF00FF"/>
+                </a:solidFill>
+              </a:rPr>
+              <a:t>มาตรฐานระดับองค์กร (</a:t>
             </a:r>
             <a:r>
               <a:rPr lang="en-US" dirty="0">
                 <a:solidFill>
-                  <a:srgbClr val="3366FF"/>
+                  <a:srgbClr val="FF00FF"/>
                 </a:solidFill>
               </a:rPr>
               <a:t>organizational standards</a:t>
@@ -11824,26 +11915,26 @@
             <a:r>
               <a:rPr lang="th-TH" dirty="0">
                 <a:solidFill>
-                  <a:srgbClr val="3366FF"/>
+                  <a:srgbClr val="FF00FF"/>
                 </a:solidFill>
               </a:rPr>
               <a:t>) </a:t>
             </a:r>
           </a:p>
           <a:p>
-            <a:pPr marL="512763" indent="-512763"/>
+            <a:pPr marL="969963" lvl="1" indent="-512763"/>
             <a:r>
               <a:rPr lang="th-TH" dirty="0">
                 <a:solidFill>
-                  <a:srgbClr val="3366FF"/>
-                </a:solidFill>
-              </a:rPr>
-              <a:t>ระดับโครงการ (</a:t>
+                  <a:srgbClr val="FF00FF"/>
+                </a:solidFill>
+              </a:rPr>
+              <a:t>มาตรฐานระดับโครงการ (</a:t>
             </a:r>
             <a:r>
               <a:rPr lang="en-US" dirty="0">
                 <a:solidFill>
-                  <a:srgbClr val="3366FF"/>
+                  <a:srgbClr val="FF00FF"/>
                 </a:solidFill>
               </a:rPr>
               <a:t>project standards</a:t>
@@ -11851,7 +11942,7 @@
             <a:r>
               <a:rPr lang="th-TH" dirty="0">
                 <a:solidFill>
-                  <a:srgbClr val="3366FF"/>
+                  <a:srgbClr val="FF00FF"/>
                 </a:solidFill>
               </a:rPr>
               <a:t>)</a:t>
@@ -11911,7 +12002,7 @@
           <a:p>
             <a:r>
               <a:rPr lang="th-TH"/>
-              <a:t>2561.11.13</a:t>
+              <a:t>2562.11.01</a:t>
             </a:r>
             <a:endParaRPr lang="th-TH" dirty="0"/>
           </a:p>
@@ -12076,7 +12167,7 @@
             <a:pPr lvl="2"/>
             <a:r>
               <a:rPr lang="th-TH" dirty="0"/>
-              <a:t>โครงสร้างเอกสาร</a:t>
+              <a:t>มาตรฐานโครงสร้างเอกสาร</a:t>
             </a:r>
           </a:p>
           <a:p>
@@ -12090,19 +12181,11 @@
             <a:pPr lvl="2"/>
             <a:r>
               <a:rPr lang="th-TH" dirty="0"/>
-              <a:t>ส่วนหัวมาตรฐานสำหรับการระบุ</a:t>
-            </a:r>
-            <a:r>
-              <a:rPr lang="th-TH"/>
-              <a:t>ความหมายของ</a:t>
-            </a:r>
-            <a:r>
-              <a:rPr lang="en-US"/>
-              <a:t> </a:t>
+              <a:t>ส่วนหัวมาตรฐานสำหรับการระบุความหมายของ</a:t>
             </a:r>
             <a:r>
               <a:rPr lang="en-US" dirty="0"/>
-              <a:t>class </a:t>
+              <a:t> class </a:t>
             </a:r>
             <a:r>
               <a:rPr lang="th-TH" dirty="0"/>
@@ -12142,18 +12225,14 @@
             <a:pPr lvl="2"/>
             <a:r>
               <a:rPr lang="th-TH" dirty="0"/>
-              <a:t>คำจำกัดความ</a:t>
-            </a:r>
-            <a:r>
-              <a:rPr lang="th-TH"/>
-              <a:t>ของ </a:t>
-            </a:r>
-            <a:r>
-              <a:rPr lang="en-US"/>
+              <a:t>คำจำกัดความของ </a:t>
+            </a:r>
+            <a:r>
+              <a:rPr lang="en-US" dirty="0"/>
               <a:t>requirement</a:t>
             </a:r>
             <a:r>
-              <a:rPr lang="th-TH"/>
+              <a:rPr lang="th-TH" dirty="0"/>
               <a:t> </a:t>
             </a:r>
             <a:endParaRPr lang="en-US" dirty="0"/>
@@ -12162,11 +12241,7 @@
             <a:pPr lvl="2"/>
             <a:r>
               <a:rPr lang="th-TH" dirty="0"/>
-              <a:t>กระบวนการออกแบบและการตรวจสอบความ</a:t>
-            </a:r>
-            <a:r>
-              <a:rPr lang="th-TH"/>
-              <a:t>ถูกต้อง </a:t>
+              <a:t>กระบวนการออกแบบและการตรวจสอบความถูกต้อง </a:t>
             </a:r>
             <a:endParaRPr lang="en-US" dirty="0"/>
           </a:p>
@@ -12174,11 +12249,7 @@
             <a:pPr lvl="2"/>
             <a:r>
               <a:rPr lang="th-TH" dirty="0"/>
-              <a:t>เครื่องมือสนับสนุน</a:t>
-            </a:r>
-            <a:r>
-              <a:rPr lang="th-TH"/>
-              <a:t>กระบวนการ </a:t>
+              <a:t>เครื่องมือสนับสนุนกระบวนการ </a:t>
             </a:r>
             <a:endParaRPr lang="en-US" dirty="0"/>
           </a:p>
@@ -12243,7 +12314,7 @@
           <a:p>
             <a:r>
               <a:rPr lang="th-TH"/>
-              <a:t>2561.11.13</a:t>
+              <a:t>2562.11.01</a:t>
             </a:r>
             <a:endParaRPr lang="th-TH" dirty="0"/>
           </a:p>
@@ -12275,7 +12346,7 @@
               <a:pPr/>
               <a:t>17</a:t>
             </a:fld>
-            <a:endParaRPr lang="th-TH"/>
+            <a:endParaRPr lang="th-TH" dirty="0"/>
           </a:p>
         </p:txBody>
       </p:sp>
@@ -12398,21 +12469,29 @@
             <a:r>
               <a:rPr lang="th-TH" dirty="0">
                 <a:solidFill>
+                  <a:srgbClr val="C00000"/>
+                </a:solidFill>
+              </a:rPr>
+              <a:t>มาตรฐานมักจะเกี่ยวข้องกับการกรอกฟอร์มที่เป็นทางการมากเกินไป</a:t>
+            </a:r>
+          </a:p>
+          <a:p>
+            <a:pPr marL="512763" indent="-512763"/>
+            <a:r>
+              <a:rPr lang="th-TH" dirty="0">
+                <a:solidFill>
                   <a:srgbClr val="3366FF"/>
                 </a:solidFill>
               </a:rPr>
-              <a:t>มาตรฐานมักจะเกี่ยวข้องกับการกรอกฟอร์มที่เป็นทางการมากเกินไป</a:t>
-            </a:r>
-          </a:p>
-          <a:p>
-            <a:pPr marL="512763" indent="-512763"/>
+              <a:t>การเก็บรักษาเอกสารการพัฒนาซอฟต์แวร์เพื่อให้เป็นไปตามมาตรฐาน มักจะเป็นงานที่ยุ่งยาก หากไม่มีเครื่องมือที่ดีมาช่วยจัดการ </a:t>
+            </a:r>
             <a:r>
               <a:rPr lang="th-TH" dirty="0">
                 <a:solidFill>
-                  <a:srgbClr val="3366FF"/>
-                </a:solidFill>
-              </a:rPr>
-              <a:t>การเก็บรักษาเอกสารการพัฒนาซอฟต์แวร์เพื่อให้เป็นไปตามมาตรฐาน มักจะเป็นงานที่ยุ่งยาก หากไม่มีเครื่องมือที่ดีมาช่วยจัดการ มักจะทำให้เกิดการต่อต้านโดยคนทำงาน</a:t>
+                  <a:srgbClr val="C00000"/>
+                </a:solidFill>
+              </a:rPr>
+              <a:t>มักจะทำให้เกิดการต่อต้านโดยคนทำงาน</a:t>
             </a:r>
           </a:p>
         </p:txBody>
@@ -12469,7 +12548,7 @@
           <a:p>
             <a:r>
               <a:rPr lang="th-TH"/>
-              <a:t>2561.11.13</a:t>
+              <a:t>2562.11.01</a:t>
             </a:r>
             <a:endParaRPr lang="th-TH" dirty="0"/>
           </a:p>
@@ -12832,7 +12911,7 @@
           <a:p>
             <a:r>
               <a:rPr lang="th-TH"/>
-              <a:t>2561.11.13</a:t>
+              <a:t>2562.11.01</a:t>
             </a:r>
             <a:endParaRPr lang="th-TH" dirty="0"/>
           </a:p>
@@ -13063,7 +13142,7 @@
           <a:p>
             <a:r>
               <a:rPr lang="th-TH"/>
-              <a:t>2561.11.13</a:t>
+              <a:t>2562.11.01</a:t>
             </a:r>
             <a:endParaRPr lang="th-TH" dirty="0"/>
           </a:p>
@@ -13227,7 +13306,7 @@
           <a:p>
             <a:r>
               <a:rPr lang="th-TH"/>
-              <a:t>2561.11.13</a:t>
+              <a:t>2562.11.01</a:t>
             </a:r>
             <a:endParaRPr lang="th-TH" dirty="0"/>
           </a:p>
@@ -13423,7 +13502,7 @@
           <a:p>
             <a:r>
               <a:rPr lang="th-TH"/>
-              <a:t>2561.11.13</a:t>
+              <a:t>2562.11.01</a:t>
             </a:r>
             <a:endParaRPr lang="th-TH" dirty="0"/>
           </a:p>
@@ -13602,15 +13681,23 @@
                   <a:srgbClr val="3366FF"/>
                 </a:solidFill>
               </a:rPr>
-              <a:t>มาตรฐาน</a:t>
-            </a:r>
-            <a:r>
-              <a:rPr lang="th-TH">
+              <a:t>มาตรฐานคุณภาพ (</a:t>
+            </a:r>
+            <a:r>
+              <a:rPr lang="en-US" dirty="0">
                 <a:solidFill>
                   <a:srgbClr val="3366FF"/>
                 </a:solidFill>
               </a:rPr>
-              <a:t>คุณภาพ (</a:t>
+              <a:t>Quality standards</a:t>
+            </a:r>
+            <a:r>
+              <a:rPr lang="th-TH" dirty="0">
+                <a:solidFill>
+                  <a:srgbClr val="3366FF"/>
+                </a:solidFill>
+              </a:rPr>
+              <a:t>)</a:t>
             </a:r>
             <a:r>
               <a:rPr lang="en-US" dirty="0">
@@ -13618,23 +13705,42 @@
                   <a:srgbClr val="3366FF"/>
                 </a:solidFill>
               </a:rPr>
-              <a:t>Quality </a:t>
-            </a:r>
-            <a:r>
-              <a:rPr lang="en-US">
+              <a:t> </a:t>
+            </a:r>
+            <a:r>
+              <a:rPr lang="th-TH" dirty="0">
                 <a:solidFill>
                   <a:srgbClr val="3366FF"/>
                 </a:solidFill>
               </a:rPr>
-              <a:t>standards</a:t>
-            </a:r>
-            <a:r>
-              <a:rPr lang="th-TH">
+              <a:t>และขั้นตอน (</a:t>
+            </a:r>
+            <a:r>
+              <a:rPr lang="en-US" dirty="0">
                 <a:solidFill>
                   <a:srgbClr val="3366FF"/>
                 </a:solidFill>
               </a:rPr>
-              <a:t>)</a:t>
+              <a:t>procedures</a:t>
+            </a:r>
+            <a:r>
+              <a:rPr lang="th-TH" dirty="0">
+                <a:solidFill>
+                  <a:srgbClr val="3366FF"/>
+                </a:solidFill>
+              </a:rPr>
+              <a:t>) ควรได้รับการจัดทำเป็นคู่มือคุณภาพขององค์กร</a:t>
+            </a:r>
+          </a:p>
+          <a:p>
+            <a:pPr marL="512763" indent="-512763"/>
+            <a:r>
+              <a:rPr lang="th-TH" dirty="0">
+                <a:solidFill>
+                  <a:srgbClr val="3366FF"/>
+                </a:solidFill>
+              </a:rPr>
+              <a:t>คู่มือด้านคุณภาพขององค์กร ที่เป็นไปตามมาตรฐาน </a:t>
             </a:r>
             <a:r>
               <a:rPr lang="en-US" dirty="0">
@@ -13642,7 +13748,7 @@
                   <a:srgbClr val="3366FF"/>
                 </a:solidFill>
               </a:rPr>
-              <a:t> </a:t>
+              <a:t>ISO 9000</a:t>
             </a:r>
             <a:r>
               <a:rPr lang="th-TH" dirty="0">
@@ -13650,86 +13756,19 @@
                   <a:srgbClr val="3366FF"/>
                 </a:solidFill>
               </a:rPr>
-              <a:t>และ</a:t>
-            </a:r>
-            <a:r>
-              <a:rPr lang="th-TH">
-                <a:solidFill>
-                  <a:srgbClr val="3366FF"/>
-                </a:solidFill>
-              </a:rPr>
-              <a:t>ขั้นตอน (</a:t>
-            </a:r>
-            <a:r>
-              <a:rPr lang="en-US" dirty="0">
-                <a:solidFill>
-                  <a:srgbClr val="3366FF"/>
-                </a:solidFill>
-              </a:rPr>
-              <a:t>procedures</a:t>
+              <a:t> อาจต้องได้รับ</a:t>
             </a:r>
             <a:r>
               <a:rPr lang="th-TH" dirty="0">
                 <a:solidFill>
-                  <a:srgbClr val="3366FF"/>
-                </a:solidFill>
-              </a:rPr>
-              <a:t>) ควรได้รับการจัดทำเป็นคู่มือคุณภาพขององค์กร</a:t>
-            </a:r>
-          </a:p>
-          <a:p>
-            <a:pPr marL="512763" indent="-512763"/>
-            <a:r>
-              <a:rPr lang="th-TH" dirty="0">
-                <a:solidFill>
-                  <a:srgbClr val="3366FF"/>
-                </a:solidFill>
-              </a:rPr>
-              <a:t>คู่มือด้านคุณภาพขององค์กร ที่เป็นไปตาม</a:t>
-            </a:r>
-            <a:r>
-              <a:rPr lang="th-TH">
-                <a:solidFill>
-                  <a:srgbClr val="3366FF"/>
-                </a:solidFill>
-              </a:rPr>
-              <a:t>มาตรฐาน </a:t>
-            </a:r>
-            <a:r>
-              <a:rPr lang="en-US">
-                <a:solidFill>
-                  <a:srgbClr val="3366FF"/>
-                </a:solidFill>
-              </a:rPr>
-              <a:t>ISO </a:t>
-            </a:r>
-            <a:r>
-              <a:rPr lang="en-US" dirty="0">
-                <a:solidFill>
-                  <a:srgbClr val="3366FF"/>
-                </a:solidFill>
-              </a:rPr>
-              <a:t>9000</a:t>
-            </a:r>
-            <a:r>
-              <a:rPr lang="th-TH" dirty="0">
-                <a:solidFill>
-                  <a:srgbClr val="3366FF"/>
-                </a:solidFill>
-              </a:rPr>
-              <a:t> อาจต้องได้รับการตรวจสอบและรับรองโดย</a:t>
-            </a:r>
-            <a:r>
-              <a:rPr lang="th-TH">
-                <a:solidFill>
-                  <a:srgbClr val="3366FF"/>
-                </a:solidFill>
-              </a:rPr>
-              <a:t>หน่วยงานภายนอก</a:t>
+                  <a:srgbClr val="C00000"/>
+                </a:solidFill>
+              </a:rPr>
+              <a:t>การตรวจสอบและรับรองโดยหน่วยงานภายนอก</a:t>
             </a:r>
             <a:endParaRPr lang="en-US" dirty="0">
               <a:solidFill>
-                <a:srgbClr val="3366FF"/>
+                <a:srgbClr val="C00000"/>
               </a:solidFill>
             </a:endParaRPr>
           </a:p>
@@ -13741,39 +13780,23 @@
                   <a:srgbClr val="3366FF"/>
                 </a:solidFill>
               </a:rPr>
-              <a:t>ลูกค้าบางราย</a:t>
-            </a:r>
-            <a:r>
-              <a:rPr lang="th-TH">
+              <a:t>ลูกค้าบางรายต้องการ </a:t>
+            </a:r>
+            <a:r>
+              <a:rPr lang="en-US" dirty="0">
                 <a:solidFill>
                   <a:srgbClr val="3366FF"/>
                 </a:solidFill>
               </a:rPr>
-              <a:t>ต้องการ </a:t>
-            </a:r>
-            <a:r>
-              <a:rPr lang="en-US" dirty="0">
+              <a:t>supplier </a:t>
+            </a:r>
+            <a:r>
+              <a:rPr lang="th-TH" dirty="0">
                 <a:solidFill>
                   <a:srgbClr val="3366FF"/>
                 </a:solidFill>
               </a:rPr>
-              <a:t>supplier </a:t>
-            </a:r>
-            <a:r>
-              <a:rPr lang="th-TH" dirty="0">
-                <a:solidFill>
-                  <a:srgbClr val="3366FF"/>
-                </a:solidFill>
-              </a:rPr>
-              <a:t>ที่ได้รับการรับรอง</a:t>
-            </a:r>
-            <a:r>
-              <a:rPr lang="th-TH">
-                <a:solidFill>
-                  <a:srgbClr val="3366FF"/>
-                </a:solidFill>
-              </a:rPr>
-              <a:t>มาตรฐาน </a:t>
+              <a:t>ที่ได้รับการรับรองมาตรฐาน </a:t>
             </a:r>
             <a:r>
               <a:rPr lang="en-US" dirty="0">
@@ -13846,7 +13869,7 @@
           <a:p>
             <a:r>
               <a:rPr lang="th-TH"/>
-              <a:t>2561.11.13</a:t>
+              <a:t>2562.11.01</a:t>
             </a:r>
             <a:endParaRPr lang="th-TH" dirty="0"/>
           </a:p>
@@ -14149,7 +14172,7 @@
           <a:p>
             <a:r>
               <a:rPr lang="th-TH"/>
-              <a:t>2561.11.13</a:t>
+              <a:t>2562.11.01</a:t>
             </a:r>
             <a:endParaRPr lang="th-TH" dirty="0"/>
           </a:p>
@@ -14487,7 +14510,7 @@
           <a:p>
             <a:r>
               <a:rPr lang="th-TH"/>
-              <a:t>2561.11.13</a:t>
+              <a:t>2562.11.01</a:t>
             </a:r>
             <a:endParaRPr lang="th-TH" dirty="0"/>
           </a:p>
@@ -14849,7 +14872,7 @@
           <a:p>
             <a:r>
               <a:rPr lang="th-TH"/>
-              <a:t>2561.11.13</a:t>
+              <a:t>2562.11.01</a:t>
             </a:r>
             <a:endParaRPr lang="th-TH" dirty="0"/>
           </a:p>
@@ -15013,7 +15036,7 @@
           <a:p>
             <a:r>
               <a:rPr lang="th-TH"/>
-              <a:t>2561.11.13</a:t>
+              <a:t>2562.11.01</a:t>
             </a:r>
             <a:endParaRPr lang="th-TH" dirty="0"/>
           </a:p>
@@ -15319,7 +15342,7 @@
           <a:p>
             <a:r>
               <a:rPr lang="th-TH"/>
-              <a:t>2561.11.13</a:t>
+              <a:t>2562.11.01</a:t>
             </a:r>
             <a:endParaRPr lang="th-TH" dirty="0"/>
           </a:p>
@@ -15588,7 +15611,7 @@
           <a:p>
             <a:r>
               <a:rPr lang="th-TH"/>
-              <a:t>2561.11.13</a:t>
+              <a:t>2562.11.01</a:t>
             </a:r>
             <a:endParaRPr lang="th-TH" dirty="0"/>
           </a:p>
@@ -16060,7 +16083,7 @@
           <a:p>
             <a:r>
               <a:rPr lang="th-TH"/>
-              <a:t>2561.11.13</a:t>
+              <a:t>2562.11.01</a:t>
             </a:r>
             <a:endParaRPr lang="th-TH" dirty="0"/>
           </a:p>
@@ -16202,7 +16225,7 @@
                   <a:srgbClr val="3366FF"/>
                 </a:solidFill>
               </a:rPr>
-              <a:t>มุ่งเน้นที่การสร้างความมั่นใจว่าผลิตภัณฑ์ซอฟต์แวร์มีระดับที่ต้องการ</a:t>
+              <a:t>มุ่งเน้นที่การสร้างความมั่นใจว่าผลิตภัณฑ์ซอฟต์แวร์มีระดับคุณภาพที่ต้องการ</a:t>
             </a:r>
           </a:p>
           <a:p>
@@ -16326,7 +16349,25 @@
                   <a:srgbClr val="FF00FF"/>
                 </a:solidFill>
               </a:rPr>
-              <a:t>การจัดการด้านคุณภาพจะเกี่ยวข้องกับการใช้กระบวนการคุณภาพที่เฉพาะเจาะจงและการตรวจสอบว่ากระบวนการวางแผนดังกล่าวได้มีการนำไปปฏิบัติแล้วหรือไม่</a:t>
+              <a:t>การจัดการด้านคุณภาพจะเกี่ยวข้องกับ</a:t>
+            </a:r>
+            <a:r>
+              <a:rPr lang="th-TH" dirty="0">
+                <a:solidFill>
+                  <a:schemeClr val="accent6">
+                    <a:lumMod val="75000"/>
+                  </a:schemeClr>
+                </a:solidFill>
+              </a:rPr>
+              <a:t>การใช้กระบวนการคุณภาพ</a:t>
+            </a:r>
+            <a:r>
+              <a:rPr lang="th-TH" dirty="0">
+                <a:solidFill>
+                  <a:srgbClr val="FF00FF"/>
+                </a:solidFill>
+              </a:rPr>
+              <a:t>ที่เฉพาะเจาะจงและการตรวจสอบว่ากระบวนการวางแผนดังกล่าวได้มีการนำไปปฏิบัติแล้วหรือไม่</a:t>
             </a:r>
           </a:p>
           <a:p>
@@ -16337,7 +16378,25 @@
                   <a:srgbClr val="FF00FF"/>
                 </a:solidFill>
               </a:rPr>
-              <a:t>การจัดการคุณภาพเกี่ยวข้องกับการจัดทำแผนคุณภาพสำหรับโครงการ แผนคุณภาพควรกำหนดเป้าหมายคุณภาพสำหรับโครงการ รวมทั้งกำหนดกระบวนการและมาตรฐานที่จะใช้</a:t>
+              <a:t>การจัดการคุณภาพเกี่ยวข้องกับ</a:t>
+            </a:r>
+            <a:r>
+              <a:rPr lang="th-TH" dirty="0">
+                <a:solidFill>
+                  <a:schemeClr val="accent6">
+                    <a:lumMod val="75000"/>
+                  </a:schemeClr>
+                </a:solidFill>
+              </a:rPr>
+              <a:t>การจัดทำแผนคุณภาพ</a:t>
+            </a:r>
+            <a:r>
+              <a:rPr lang="th-TH" dirty="0">
+                <a:solidFill>
+                  <a:srgbClr val="FF00FF"/>
+                </a:solidFill>
+              </a:rPr>
+              <a:t>สำหรับโครงการ แผนคุณภาพควรกำหนดเป้าหมายคุณภาพสำหรับโครงการ รวมทั้งกำหนดกระบวนการและมาตรฐานที่จะใช้</a:t>
             </a:r>
           </a:p>
         </p:txBody>
@@ -16394,7 +16453,7 @@
           <a:p>
             <a:r>
               <a:rPr lang="th-TH"/>
-              <a:t>2561.11.13</a:t>
+              <a:t>2562.11.01</a:t>
             </a:r>
             <a:endParaRPr lang="th-TH" dirty="0"/>
           </a:p>
@@ -16558,7 +16617,7 @@
           <a:p>
             <a:r>
               <a:rPr lang="th-TH"/>
-              <a:t>2561.11.13</a:t>
+              <a:t>2562.11.01</a:t>
             </a:r>
             <a:endParaRPr lang="th-TH" dirty="0"/>
           </a:p>
@@ -17390,7 +17449,7 @@
           <a:p>
             <a:r>
               <a:rPr lang="th-TH"/>
-              <a:t>2561.11.13</a:t>
+              <a:t>2562.11.01</a:t>
             </a:r>
             <a:endParaRPr lang="th-TH" dirty="0"/>
           </a:p>
@@ -18070,7 +18129,7 @@
           <a:p>
             <a:r>
               <a:rPr lang="th-TH"/>
-              <a:t>2561.11.13</a:t>
+              <a:t>2562.11.01</a:t>
             </a:r>
             <a:endParaRPr lang="th-TH" dirty="0"/>
           </a:p>
@@ -18278,7 +18337,15 @@
                   <a:srgbClr val="3366FF"/>
                 </a:solidFill>
               </a:rPr>
-              <a:t>ถือว่าเป็นเรื่องไม่เป็นทางการ</a:t>
+              <a:t>ถือว่าเป็นเรื่อง</a:t>
+            </a:r>
+            <a:r>
+              <a:rPr lang="th-TH" dirty="0">
+                <a:solidFill>
+                  <a:srgbClr val="C00000"/>
+                </a:solidFill>
+              </a:rPr>
+              <a:t>ไม่เป็นทางการ</a:t>
             </a:r>
           </a:p>
           <a:p>
@@ -18386,7 +18453,7 @@
           <a:p>
             <a:r>
               <a:rPr lang="th-TH"/>
-              <a:t>2561.11.13</a:t>
+              <a:t>2562.11.01</a:t>
             </a:r>
             <a:endParaRPr lang="th-TH" dirty="0"/>
           </a:p>
@@ -18709,7 +18776,7 @@
           <a:p>
             <a:r>
               <a:rPr lang="th-TH"/>
-              <a:t>2561.11.13</a:t>
+              <a:t>2562.11.01</a:t>
             </a:r>
             <a:endParaRPr lang="th-TH" dirty="0"/>
           </a:p>
@@ -19036,7 +19103,7 @@
           <a:p>
             <a:r>
               <a:rPr lang="th-TH"/>
-              <a:t>2561.11.13</a:t>
+              <a:t>2562.11.01</a:t>
             </a:r>
             <a:endParaRPr lang="th-TH" dirty="0"/>
           </a:p>
@@ -19273,7 +19340,7 @@
           <a:p>
             <a:r>
               <a:rPr lang="th-TH"/>
-              <a:t>2561.11.13</a:t>
+              <a:t>2562.11.01</a:t>
             </a:r>
             <a:endParaRPr lang="th-TH" dirty="0"/>
           </a:p>
@@ -19504,7 +19571,7 @@
           <a:p>
             <a:r>
               <a:rPr lang="th-TH"/>
-              <a:t>2561.11.13</a:t>
+              <a:t>2562.11.01</a:t>
             </a:r>
             <a:endParaRPr lang="th-TH" dirty="0"/>
           </a:p>
@@ -19765,7 +19832,7 @@
           <a:p>
             <a:r>
               <a:rPr lang="th-TH"/>
-              <a:t>2561.11.13</a:t>
+              <a:t>2562.11.01</a:t>
             </a:r>
             <a:endParaRPr lang="th-TH" dirty="0"/>
           </a:p>
@@ -19934,7 +20001,7 @@
           <a:p>
             <a:r>
               <a:rPr lang="th-TH"/>
-              <a:t>2561.11.13</a:t>
+              <a:t>2562.11.01</a:t>
             </a:r>
             <a:endParaRPr lang="th-TH" dirty="0"/>
           </a:p>
@@ -20127,7 +20194,7 @@
           <a:p>
             <a:r>
               <a:rPr lang="th-TH"/>
-              <a:t>2561.11.13</a:t>
+              <a:t>2562.11.01</a:t>
             </a:r>
             <a:endParaRPr lang="th-TH" dirty="0"/>
           </a:p>
@@ -20444,7 +20511,7 @@
           <a:p>
             <a:r>
               <a:rPr lang="th-TH"/>
-              <a:t>2561.11.13</a:t>
+              <a:t>2562.11.01</a:t>
             </a:r>
             <a:endParaRPr lang="th-TH" dirty="0"/>
           </a:p>
@@ -20580,88 +20647,61 @@
         </p:spPr>
         <p:txBody>
           <a:bodyPr vert="horz" lIns="91440" tIns="45720" rIns="91440" bIns="45720" rtlCol="0">
-            <a:normAutofit fontScale="92500"/>
+            <a:normAutofit lnSpcReduction="10000"/>
           </a:bodyPr>
           <a:lstStyle/>
           <a:p>
             <a:pPr marL="512763" indent="-512763"/>
             <a:r>
-              <a:rPr lang="en-US">
+              <a:rPr lang="th-TH" dirty="0">
                 <a:solidFill>
                   <a:srgbClr val="3366FF"/>
                 </a:solidFill>
               </a:rPr>
-              <a:t>Software </a:t>
+              <a:t>คือการวัดใด ๆ ที่เกี่ยวข้องกับระบบซอฟต์แวร์ กระบวนการ หรือเอกสารที่เกี่ยวข้อง</a:t>
+            </a:r>
+          </a:p>
+          <a:p>
+            <a:pPr marL="969963" lvl="1" indent="-512763"/>
+            <a:r>
+              <a:rPr lang="th-TH" dirty="0">
+                <a:solidFill>
+                  <a:srgbClr val="FF00FF"/>
+                </a:solidFill>
+              </a:rPr>
+              <a:t>เช่น บรรทัดของรหัสในโปรแกรม</a:t>
             </a:r>
             <a:r>
               <a:rPr lang="en-US" dirty="0">
                 <a:solidFill>
-                  <a:srgbClr val="3366FF"/>
-                </a:solidFill>
-              </a:rPr>
-              <a:t>metric</a:t>
-            </a:r>
-          </a:p>
-          <a:p>
-            <a:pPr marL="512763" indent="-512763"/>
+                  <a:srgbClr val="FF00FF"/>
+                </a:solidFill>
+              </a:rPr>
+              <a:t>,</a:t>
+            </a:r>
             <a:r>
               <a:rPr lang="th-TH" dirty="0">
                 <a:solidFill>
-                  <a:srgbClr val="3366FF"/>
-                </a:solidFill>
-              </a:rPr>
-              <a:t>คือการวัดใด ๆ ที่เกี่ยวข้องกับระบบซอฟต์แวร์ กระบวนการ หรือเอกสารที่เกี่ยวข้อง</a:t>
-            </a:r>
-          </a:p>
-          <a:p>
-            <a:pPr marL="969963" lvl="1" indent="-512763"/>
+                  <a:srgbClr val="FF00FF"/>
+                </a:solidFill>
+              </a:rPr>
+              <a:t> </a:t>
+            </a:r>
+            <a:r>
+              <a:rPr lang="en-US" dirty="0">
+                <a:solidFill>
+                  <a:srgbClr val="FF00FF"/>
+                </a:solidFill>
+              </a:rPr>
+              <a:t>Fox index,</a:t>
+            </a:r>
             <a:r>
               <a:rPr lang="th-TH" dirty="0">
                 <a:solidFill>
                   <a:srgbClr val="FF00FF"/>
                 </a:solidFill>
               </a:rPr>
-              <a:t>เช่น บรรทัดของรหัส</a:t>
-            </a:r>
-            <a:r>
-              <a:rPr lang="th-TH">
-                <a:solidFill>
-                  <a:srgbClr val="FF00FF"/>
-                </a:solidFill>
-              </a:rPr>
-              <a:t>ในโปรแกรม</a:t>
-            </a:r>
-            <a:r>
-              <a:rPr lang="en-US">
-                <a:solidFill>
-                  <a:srgbClr val="FF00FF"/>
-                </a:solidFill>
-              </a:rPr>
-              <a:t>,</a:t>
-            </a:r>
-            <a:r>
-              <a:rPr lang="th-TH">
-                <a:solidFill>
-                  <a:srgbClr val="FF00FF"/>
-                </a:solidFill>
-              </a:rPr>
-              <a:t> </a:t>
-            </a:r>
-            <a:r>
-              <a:rPr lang="en-US" dirty="0">
-                <a:solidFill>
-                  <a:srgbClr val="FF00FF"/>
-                </a:solidFill>
-              </a:rPr>
-              <a:t>Fox index,</a:t>
-            </a:r>
-            <a:r>
-              <a:rPr lang="th-TH" dirty="0">
-                <a:solidFill>
-                  <a:srgbClr val="FF00FF"/>
-                </a:solidFill>
-              </a:rPr>
-              <a:t> จำนวนคน-วันที่จำเป็นในการพัฒนา</a:t>
+              <a:t> จำนวนคน-วัน ที่จำเป็นในการพัฒนา</a:t>
             </a:r>
           </a:p>
           <a:p>
@@ -20759,7 +20799,7 @@
           <a:p>
             <a:r>
               <a:rPr lang="th-TH"/>
-              <a:t>2561.11.13</a:t>
+              <a:t>2562.11.01</a:t>
             </a:r>
             <a:endParaRPr lang="th-TH" dirty="0"/>
           </a:p>
@@ -21051,7 +21091,7 @@
           <a:p>
             <a:r>
               <a:rPr lang="th-TH"/>
-              <a:t>2561.11.13</a:t>
+              <a:t>2562.11.01</a:t>
             </a:r>
             <a:endParaRPr lang="th-TH" dirty="0"/>
           </a:p>
@@ -21215,7 +21255,7 @@
           <a:p>
             <a:r>
               <a:rPr lang="th-TH"/>
-              <a:t>2561.11.13</a:t>
+              <a:t>2562.11.01</a:t>
             </a:r>
             <a:endParaRPr lang="th-TH" dirty="0"/>
           </a:p>
@@ -21411,7 +21451,7 @@
           <a:p>
             <a:r>
               <a:rPr lang="th-TH"/>
-              <a:t>2561.11.13</a:t>
+              <a:t>2562.11.01</a:t>
             </a:r>
             <a:endParaRPr lang="th-TH" dirty="0"/>
           </a:p>
@@ -21756,7 +21796,7 @@
           <a:p>
             <a:r>
               <a:rPr lang="th-TH"/>
-              <a:t>2561.11.13</a:t>
+              <a:t>2562.11.01</a:t>
             </a:r>
             <a:endParaRPr lang="th-TH" dirty="0"/>
           </a:p>
@@ -22022,7 +22062,7 @@
           <a:p>
             <a:r>
               <a:rPr lang="th-TH"/>
-              <a:t>2561.11.13</a:t>
+              <a:t>2562.11.01</a:t>
             </a:r>
             <a:endParaRPr lang="th-TH" dirty="0"/>
           </a:p>
@@ -22269,7 +22309,7 @@
           <a:p>
             <a:r>
               <a:rPr lang="th-TH"/>
-              <a:t>2561.11.13</a:t>
+              <a:t>2562.11.01</a:t>
             </a:r>
             <a:endParaRPr lang="th-TH" dirty="0"/>
           </a:p>
@@ -22433,7 +22473,7 @@
           <a:p>
             <a:r>
               <a:rPr lang="th-TH"/>
-              <a:t>2561.11.13</a:t>
+              <a:t>2562.11.01</a:t>
             </a:r>
             <a:endParaRPr lang="th-TH" dirty="0"/>
           </a:p>
@@ -22696,7 +22736,7 @@
           <a:p>
             <a:r>
               <a:rPr lang="th-TH"/>
-              <a:t>2561.11.13</a:t>
+              <a:t>2562.11.01</a:t>
             </a:r>
             <a:endParaRPr lang="th-TH" dirty="0"/>
           </a:p>
@@ -22977,7 +23017,7 @@
           <a:p>
             <a:r>
               <a:rPr lang="th-TH"/>
-              <a:t>2561.11.13</a:t>
+              <a:t>2562.11.01</a:t>
             </a:r>
             <a:endParaRPr lang="th-TH" dirty="0"/>
           </a:p>
@@ -23248,7 +23288,7 @@
           <a:p>
             <a:r>
               <a:rPr lang="th-TH"/>
-              <a:t>2561.11.13</a:t>
+              <a:t>2562.11.01</a:t>
             </a:r>
             <a:endParaRPr lang="th-TH" dirty="0"/>
           </a:p>
@@ -23553,7 +23593,7 @@
           <a:p>
             <a:r>
               <a:rPr lang="th-TH"/>
-              <a:t>2561.11.13</a:t>
+              <a:t>2562.11.01</a:t>
             </a:r>
             <a:endParaRPr lang="th-TH" dirty="0"/>
           </a:p>
@@ -23878,7 +23918,7 @@
           <a:p>
             <a:r>
               <a:rPr lang="th-TH"/>
-              <a:t>2561.11.13</a:t>
+              <a:t>2562.11.01</a:t>
             </a:r>
             <a:endParaRPr lang="th-TH" dirty="0"/>
           </a:p>
@@ -24163,7 +24203,7 @@
           <a:p>
             <a:r>
               <a:rPr lang="th-TH"/>
-              <a:t>2561.11.13</a:t>
+              <a:t>2562.11.01</a:t>
             </a:r>
             <a:endParaRPr lang="th-TH" dirty="0"/>
           </a:p>
@@ -24402,7 +24442,7 @@
           <a:p>
             <a:r>
               <a:rPr lang="th-TH"/>
-              <a:t>2561.11.13</a:t>
+              <a:t>2562.11.01</a:t>
             </a:r>
             <a:endParaRPr lang="th-TH" dirty="0"/>
           </a:p>
@@ -24584,7 +24624,7 @@
           <a:p>
             <a:r>
               <a:rPr lang="th-TH"/>
-              <a:t>2561.11.13</a:t>
+              <a:t>2562.11.01</a:t>
             </a:r>
             <a:endParaRPr lang="th-TH" dirty="0"/>
           </a:p>
@@ -24742,7 +24782,15 @@
                   <a:srgbClr val="3366FF"/>
                 </a:solidFill>
               </a:rPr>
-              <a:t>เอกสารควบคุมคุณภาพ ใช้บันทึกความคืบหน้าและช่วยรักษาความต่อเนื่องของการพัฒนาในกรณีที่มีการเปลี่ยนแปลงทีมพัฒนา</a:t>
+              <a:t>เอกสารควบคุมคุณภาพ ใช้บันทึกความคืบหน้าและช่วยรักษาความต่อเนื่องของการพัฒนาในกรณีที่มีการ</a:t>
+            </a:r>
+            <a:r>
+              <a:rPr lang="th-TH" dirty="0">
+                <a:solidFill>
+                  <a:srgbClr val="FF00FF"/>
+                </a:solidFill>
+              </a:rPr>
+              <a:t>เปลี่ยนแปลงทีมพัฒนา</a:t>
             </a:r>
           </a:p>
           <a:p>
@@ -24753,7 +24801,15 @@
                   <a:srgbClr val="3366FF"/>
                 </a:solidFill>
               </a:rPr>
-              <a:t>สำหรับระบบขนาดเล็ก การจัดการด้านคุณภาพจะมีเอกสารน้อยลงและควรเน้นการสร้างวัฒนธรรมที่เน้นคุณภาพ</a:t>
+              <a:t>สำหรับระบบขนาดเล็ก การจัดการด้านคุณภาพจะมีเอกสารน้อยลงและควรเน้น</a:t>
+            </a:r>
+            <a:r>
+              <a:rPr lang="th-TH" dirty="0">
+                <a:solidFill>
+                  <a:srgbClr val="FF00FF"/>
+                </a:solidFill>
+              </a:rPr>
+              <a:t>การสร้างวัฒนธรรมที่เน้นคุณภาพ</a:t>
             </a:r>
           </a:p>
           <a:p>
@@ -24842,7 +24898,7 @@
           <a:p>
             <a:r>
               <a:rPr lang="th-TH"/>
-              <a:t>2561.11.13</a:t>
+              <a:t>2562.11.01</a:t>
             </a:r>
             <a:endParaRPr lang="th-TH" dirty="0"/>
           </a:p>
@@ -25009,7 +25065,7 @@
           <a:p>
             <a:r>
               <a:rPr lang="th-TH"/>
-              <a:t>2561.11.13</a:t>
+              <a:t>2562.11.01</a:t>
             </a:r>
             <a:endParaRPr lang="th-TH" dirty="0"/>
           </a:p>
@@ -25325,7 +25381,7 @@
           <a:p>
             <a:r>
               <a:rPr lang="th-TH"/>
-              <a:t>2561.11.13</a:t>
+              <a:t>2562.11.01</a:t>
             </a:r>
             <a:endParaRPr lang="th-TH" dirty="0"/>
           </a:p>
@@ -25584,7 +25640,7 @@
           <a:p>
             <a:r>
               <a:rPr lang="th-TH"/>
-              <a:t>2561.11.13</a:t>
+              <a:t>2562.11.01</a:t>
             </a:r>
             <a:endParaRPr lang="th-TH" dirty="0"/>
           </a:p>

</xml_diff>